<commit_message>
modifying and adding some files in the .gitignore
</commit_message>
<xml_diff>
--- a/your-project/stopthebus_presentation.pptx
+++ b/your-project/stopthebus_presentation.pptx
@@ -112,6 +112,11 @@
       </a:defRPr>
     </a:lvl9pPr>
   </p:defaultTextStyle>
+  <p:extLst>
+    <p:ext uri="{EFAFB233-063F-42B5-8137-9DF3F51BA10A}">
+      <p15:sldGuideLst xmlns:p15="http://schemas.microsoft.com/office/powerpoint/2012/main"/>
+    </p:ext>
+  </p:extLst>
 </p:presentation>
 </file>
 
@@ -3672,70 +3677,31 @@
         <p:spPr/>
         <p:txBody>
           <a:bodyPr>
-            <a:normAutofit lnSpcReduction="10000"/>
+            <a:normAutofit/>
           </a:bodyPr>
           <a:lstStyle/>
           <a:p>
-            <a:pPr marL="0" indent="0">
-              <a:buNone/>
-            </a:pPr>
             <a:r>
               <a:rPr lang="en-US" dirty="0"/>
-              <a:t>First, decide how many rounds will have the game</a:t>
-            </a:r>
-          </a:p>
-          <a:p>
-            <a:pPr marL="0" indent="0">
-              <a:buNone/>
-            </a:pPr>
+              <a:t>Decide number of rounds</a:t>
+            </a:r>
+          </a:p>
+          <a:p>
             <a:r>
               <a:rPr lang="en-US" dirty="0"/>
-              <a:t>Afterwards, the game starts.</a:t>
-            </a:r>
-          </a:p>
-          <a:p>
-            <a:pPr marL="0" indent="0">
-              <a:buNone/>
-            </a:pPr>
-            <a:r>
-              <a:rPr lang="en-US" dirty="0"/>
-              <a:t>A random letter is generated and each team has to find a word for each category starting with the chosen letter</a:t>
-            </a:r>
-          </a:p>
-          <a:p>
-            <a:pPr marL="0" indent="0">
-              <a:buNone/>
-            </a:pPr>
-            <a:r>
-              <a:rPr lang="en-US" dirty="0"/>
-              <a:t>Once all the categories are filled, the round ends. </a:t>
-            </a:r>
-          </a:p>
-          <a:p>
-            <a:pPr marL="0" indent="0">
-              <a:buNone/>
-            </a:pPr>
+              <a:t>A random letter is generated per round and each team must fill each category starting with the chosen letter</a:t>
+            </a:r>
+          </a:p>
+          <a:p>
             <a:r>
               <a:rPr lang="en-US" dirty="0"/>
               <a:t>The sum of the length of each word will be compared in between each team. The one team with the largest length, wins the round and scores +1</a:t>
             </a:r>
           </a:p>
           <a:p>
-            <a:pPr marL="0" indent="0">
-              <a:buNone/>
-            </a:pPr>
             <a:r>
               <a:rPr lang="en-US" dirty="0"/>
-              <a:t>The game ends when there is no more rounds.</a:t>
-            </a:r>
-          </a:p>
-          <a:p>
-            <a:pPr marL="0" indent="0">
-              <a:buNone/>
-            </a:pPr>
-            <a:r>
-              <a:rPr lang="en-US" dirty="0"/>
-              <a:t>The team with higher score wins.</a:t>
+              <a:t>The team with higher score wins</a:t>
             </a:r>
           </a:p>
         </p:txBody>
@@ -3825,15 +3791,7 @@
             </a:pPr>
             <a:r>
               <a:rPr lang="en-US" dirty="0"/>
-              <a:t>In the first place, I </a:t>
-            </a:r>
-            <a:r>
-              <a:rPr lang="en-US"/>
-              <a:t>decided which </a:t>
-            </a:r>
-            <a:r>
-              <a:rPr lang="en-US" dirty="0"/>
-              <a:t>steps I needed for the whole project.</a:t>
+              <a:t>Overview of the project</a:t>
             </a:r>
           </a:p>
           <a:p>
@@ -3848,7 +3806,7 @@
             </a:pPr>
             <a:r>
               <a:rPr lang="en-US" dirty="0"/>
-              <a:t>Then, I decided the order for each step and started developing the game.</a:t>
+              <a:t>Step by step</a:t>
             </a:r>
           </a:p>
           <a:p>
@@ -3863,7 +3821,7 @@
             </a:pPr>
             <a:r>
               <a:rPr lang="en-US" dirty="0"/>
-              <a:t>Once the coding was done, I checked for the bugs that I was able to fix.</a:t>
+              <a:t>Coding and bug tracking</a:t>
             </a:r>
           </a:p>
           <a:p>
@@ -3878,7 +3836,7 @@
             </a:pPr>
             <a:r>
               <a:rPr lang="en-US" dirty="0"/>
-              <a:t>Finally I tried to run the program part by part, then the whole thing together.</a:t>
+              <a:t>Run the program</a:t>
             </a:r>
           </a:p>
         </p:txBody>
@@ -4092,12 +4050,9 @@
           <a:bodyPr/>
           <a:lstStyle/>
           <a:p>
-            <a:r>
-              <a:rPr lang="en-US" dirty="0"/>
-              <a:t>Programmers are not lazy or sad people, they are misunderstood individuals</a:t>
-            </a:r>
-          </a:p>
-          <a:p>
+            <a:pPr marL="0" indent="0">
+              <a:buNone/>
+            </a:pPr>
             <a:endParaRPr lang="en-US" dirty="0"/>
           </a:p>
           <a:p>
@@ -4112,7 +4067,7 @@
           <a:p>
             <a:r>
               <a:rPr lang="en-US" dirty="0"/>
-              <a:t>Programming is like poetry: if you use the right words and expressions in the right places, success is assured. Learning, then, is key.</a:t>
+              <a:t>Programming is like poetry: if you use the right words and expressions in the right places, success is assured.</a:t>
             </a:r>
           </a:p>
         </p:txBody>
@@ -4367,6 +4322,9 @@
   <p:clrMapOvr>
     <a:masterClrMapping/>
   </p:clrMapOvr>
+  <p:transition spd="slow">
+    <p:push dir="u"/>
+  </p:transition>
 </p:sld>
 </file>
 
@@ -4403,14 +4361,19 @@
             <p:ph type="title"/>
           </p:nvPr>
         </p:nvSpPr>
-        <p:spPr/>
+        <p:spPr>
+          <a:xfrm>
+            <a:off x="4522433" y="267470"/>
+            <a:ext cx="10515600" cy="1325563"/>
+          </a:xfrm>
+        </p:spPr>
         <p:txBody>
           <a:bodyPr/>
           <a:lstStyle/>
           <a:p>
             <a:r>
               <a:rPr lang="en-US" dirty="0"/>
-              <a:t>THANKS (specially you Ali)</a:t>
+              <a:t>THANKS!</a:t>
             </a:r>
           </a:p>
         </p:txBody>

</xml_diff>